<commit_message>
minor change to feature presentation pptx
</commit_message>
<xml_diff>
--- a/Documentation/7. Envelope, TM and STFT features.pptx
+++ b/Documentation/7. Envelope, TM and STFT features.pptx
@@ -18000,15 +18000,16 @@
             </a:r>
           </a:p>
           <a:p>
-            <a:endParaRPr lang="en-US" sz="1600" dirty="0"/>
-          </a:p>
-          <a:p>
             <a:pPr marL="0" indent="0">
               <a:buNone/>
             </a:pPr>
             <a:r>
               <a:rPr lang="en-US" sz="1600" dirty="0"/>
-              <a:t>Moreover, STFT usage has been explored but features have not been evaluated for the time being as they would have to be meticulously defined from scratch. Otherwise, redundant information would be introduced.</a:t>
+              <a:t>Moreover, STFT usage has been explored but features have not been evaluated for the time being as they would have to be meticulously defined from scratch. Otherwise, redundant information would be </a:t>
+            </a:r>
+            <a:r>
+              <a:rPr lang="en-US" sz="1600"/>
+              <a:t>introduced.</a:t>
             </a:r>
           </a:p>
           <a:p>
@@ -18023,6 +18024,21 @@
             </a:pPr>
             <a:r>
               <a:rPr lang="en-US" sz="1600" dirty="0"/>
+              <a:t>Other similar studies used DWT based features (similar to the one introduced with TM), autocorrelation-based features, self-similarity features and complexity-analysis based features. </a:t>
+            </a:r>
+          </a:p>
+          <a:p>
+            <a:pPr marL="0" indent="0">
+              <a:buNone/>
+            </a:pPr>
+            <a:endParaRPr lang="en-US" sz="1600" dirty="0"/>
+          </a:p>
+          <a:p>
+            <a:pPr marL="0" indent="0">
+              <a:buNone/>
+            </a:pPr>
+            <a:r>
+              <a:rPr lang="en-US" sz="1600" dirty="0"/>
               <a:t>In the following will be defined and analyzed 3 models:</a:t>
             </a:r>
           </a:p>
@@ -18053,7 +18069,7 @@
             </a:pPr>
             <a:r>
               <a:rPr lang="en-US" sz="1600" dirty="0"/>
-              <a:t>A decision tree (LOPOCV) trained onto a optimized feature set</a:t>
+              <a:t>A decision tree (LOPOCV) trained onto an optimized feature set</a:t>
             </a:r>
           </a:p>
           <a:p>

</xml_diff>

<commit_message>
ready for simplified feature set analysis
</commit_message>
<xml_diff>
--- a/Documentation/7. Envelope, TM and STFT features.pptx
+++ b/Documentation/7. Envelope, TM and STFT features.pptx
@@ -226,7 +226,7 @@
           <a:p>
             <a:fld id="{1A21894F-B278-4D96-9594-A030EA633187}" type="datetimeFigureOut">
               <a:rPr lang="it-IT" smtClean="0"/>
-              <a:t>05/12/2024</a:t>
+              <a:t>06/12/2024</a:t>
             </a:fld>
             <a:endParaRPr lang="it-IT"/>
           </a:p>
@@ -4062,7 +4062,7 @@
           <a:p>
             <a:fld id="{58E4D78B-0F35-4E3B-A0B9-554BA787D8A4}" type="datetime1">
               <a:rPr lang="en-US" smtClean="0"/>
-              <a:t>12/5/2024</a:t>
+              <a:t>12/6/2024</a:t>
             </a:fld>
             <a:endParaRPr lang="en-US"/>
           </a:p>
@@ -4272,7 +4272,7 @@
           <a:p>
             <a:fld id="{604487E5-BE79-4BAC-AEB7-0CE0533B5E5C}" type="datetime1">
               <a:rPr lang="en-US" smtClean="0"/>
-              <a:t>12/5/2024</a:t>
+              <a:t>12/6/2024</a:t>
             </a:fld>
             <a:endParaRPr lang="en-US"/>
           </a:p>
@@ -4472,7 +4472,7 @@
           <a:p>
             <a:fld id="{DDA7E0CB-9E21-49FD-99A0-0CD75BBC45F4}" type="datetime1">
               <a:rPr lang="en-US" smtClean="0"/>
-              <a:t>12/5/2024</a:t>
+              <a:t>12/6/2024</a:t>
             </a:fld>
             <a:endParaRPr lang="en-US"/>
           </a:p>
@@ -4748,7 +4748,7 @@
           <a:p>
             <a:fld id="{661D7149-FE96-419A-8F67-9BD351842985}" type="datetime1">
               <a:rPr lang="en-US" smtClean="0"/>
-              <a:t>12/5/2024</a:t>
+              <a:t>12/6/2024</a:t>
             </a:fld>
             <a:endParaRPr lang="en-US"/>
           </a:p>
@@ -5016,7 +5016,7 @@
           <a:p>
             <a:fld id="{6CA97CEF-DD94-4A20-85BC-5094F3EA8887}" type="datetime1">
               <a:rPr lang="en-US" smtClean="0"/>
-              <a:t>12/5/2024</a:t>
+              <a:t>12/6/2024</a:t>
             </a:fld>
             <a:endParaRPr lang="en-US"/>
           </a:p>
@@ -5431,7 +5431,7 @@
           <a:p>
             <a:fld id="{9862EB4C-45F8-47BA-B435-B6097D61B684}" type="datetime1">
               <a:rPr lang="en-US" smtClean="0"/>
-              <a:t>12/5/2024</a:t>
+              <a:t>12/6/2024</a:t>
             </a:fld>
             <a:endParaRPr lang="en-US"/>
           </a:p>
@@ -5573,7 +5573,7 @@
           <a:p>
             <a:fld id="{FA7CD0E2-B7EC-4D81-9389-8F889EE865AB}" type="datetime1">
               <a:rPr lang="en-US" smtClean="0"/>
-              <a:t>12/5/2024</a:t>
+              <a:t>12/6/2024</a:t>
             </a:fld>
             <a:endParaRPr lang="en-US"/>
           </a:p>
@@ -5686,7 +5686,7 @@
           <a:p>
             <a:fld id="{18B47F5C-7FA0-44DA-BF82-413AB90208B7}" type="datetime1">
               <a:rPr lang="en-US" smtClean="0"/>
-              <a:t>12/5/2024</a:t>
+              <a:t>12/6/2024</a:t>
             </a:fld>
             <a:endParaRPr lang="en-US"/>
           </a:p>
@@ -5999,7 +5999,7 @@
           <a:p>
             <a:fld id="{403415A8-F8BD-47CC-8D20-53798396961D}" type="datetime1">
               <a:rPr lang="en-US" smtClean="0"/>
-              <a:t>12/5/2024</a:t>
+              <a:t>12/6/2024</a:t>
             </a:fld>
             <a:endParaRPr lang="en-US"/>
           </a:p>
@@ -6288,7 +6288,7 @@
           <a:p>
             <a:fld id="{6A12F5A1-6669-4CDD-B1B4-04FFE5C41ADE}" type="datetime1">
               <a:rPr lang="en-US" smtClean="0"/>
-              <a:t>12/5/2024</a:t>
+              <a:t>12/6/2024</a:t>
             </a:fld>
             <a:endParaRPr lang="en-US"/>
           </a:p>
@@ -6492,7 +6492,7 @@
           <a:p>
             <a:fld id="{63421662-C242-4258-8799-9F32C0D7CC75}" type="datetime1">
               <a:rPr lang="en-US" smtClean="0"/>
-              <a:t>12/5/2024</a:t>
+              <a:t>12/6/2024</a:t>
             </a:fld>
             <a:endParaRPr lang="en-US"/>
           </a:p>
@@ -16898,8 +16898,8 @@
           </a:p>
         </p:txBody>
       </p:sp>
-      <mc:AlternateContent xmlns:mc="http://schemas.openxmlformats.org/markup-compatibility/2006" xmlns:a14="http://schemas.microsoft.com/office/drawing/2010/main">
-        <mc:Choice Requires="a14">
+      <mc:AlternateContent xmlns:mc="http://schemas.openxmlformats.org/markup-compatibility/2006">
+        <mc:Choice xmlns:a14="http://schemas.microsoft.com/office/drawing/2010/main" Requires="a14">
           <p:sp>
             <p:nvSpPr>
               <p:cNvPr id="9" name="Segnaposto contenuto 2">
@@ -17358,7 +17358,27 @@
                       <a:schemeClr val="tx1"/>
                     </a:solidFill>
                   </a:rPr>
-                  <a:t>M=64 </a:t>
+                  <a:t>M=64, </a:t>
+                </a:r>
+                <a:r>
+                  <a:rPr lang="en-GB" sz="1100" dirty="0" err="1">
+                    <a:solidFill>
+                      <a:schemeClr val="tx1"/>
+                    </a:solidFill>
+                  </a:rPr>
+                  <a:t>c</a:t>
+                </a:r>
+                <a:r>
+                  <a:rPr lang="en-GB" sz="1100" dirty="0" err="1"/>
+                  <a:t>e</a:t>
+                </a:r>
+                <a:r>
+                  <a:rPr lang="en-GB" sz="1100" dirty="0" err="1">
+                    <a:solidFill>
+                      <a:schemeClr val="tx1"/>
+                    </a:solidFill>
+                  </a:rPr>
+                  <a:t>ntered</a:t>
                 </a:r>
                 <a:r>
                   <a:rPr lang="en-GB" sz="1100" dirty="0">
@@ -17366,7 +17386,7 @@
                       <a:schemeClr val="tx1"/>
                     </a:solidFill>
                   </a:rPr>
-                  <a:t>and cantered into </a:t>
+                  <a:t> into </a:t>
                 </a:r>
                 <a:r>
                   <a:rPr lang="en-GB" sz="1100" i="1" dirty="0">
@@ -17473,7 +17493,7 @@
             </p:txBody>
           </p:sp>
         </mc:Choice>
-        <mc:Fallback xmlns="">
+        <mc:Fallback>
           <p:sp>
             <p:nvSpPr>
               <p:cNvPr id="9" name="Segnaposto contenuto 2">

</xml_diff>